<commit_message>
Setup for session 11
</commit_message>
<xml_diff>
--- a/Session 10.pptx
+++ b/Session 10.pptx
@@ -247,7 +247,7 @@
           <a:p>
             <a:fld id="{471E68FF-328F-104F-BC80-393576CFDC5A}" type="datetimeFigureOut">
               <a:rPr lang="en-US" smtClean="0"/>
-              <a:t>5/19/20</a:t>
+              <a:t>5/20/20</a:t>
             </a:fld>
             <a:endParaRPr lang="en-US"/>
           </a:p>
@@ -412,7 +412,7 @@
           <a:p>
             <a:fld id="{471E68FF-328F-104F-BC80-393576CFDC5A}" type="datetimeFigureOut">
               <a:rPr lang="en-US" smtClean="0"/>
-              <a:t>5/19/20</a:t>
+              <a:t>5/20/20</a:t>
             </a:fld>
             <a:endParaRPr lang="en-US"/>
           </a:p>
@@ -587,7 +587,7 @@
           <a:p>
             <a:fld id="{471E68FF-328F-104F-BC80-393576CFDC5A}" type="datetimeFigureOut">
               <a:rPr lang="en-US" smtClean="0"/>
-              <a:t>5/19/20</a:t>
+              <a:t>5/20/20</a:t>
             </a:fld>
             <a:endParaRPr lang="en-US"/>
           </a:p>
@@ -752,7 +752,7 @@
           <a:p>
             <a:fld id="{471E68FF-328F-104F-BC80-393576CFDC5A}" type="datetimeFigureOut">
               <a:rPr lang="en-US" smtClean="0"/>
-              <a:t>5/19/20</a:t>
+              <a:t>5/20/20</a:t>
             </a:fld>
             <a:endParaRPr lang="en-US"/>
           </a:p>
@@ -991,7 +991,7 @@
           <a:p>
             <a:fld id="{471E68FF-328F-104F-BC80-393576CFDC5A}" type="datetimeFigureOut">
               <a:rPr lang="en-US" smtClean="0"/>
-              <a:t>5/19/20</a:t>
+              <a:t>5/20/20</a:t>
             </a:fld>
             <a:endParaRPr lang="en-US"/>
           </a:p>
@@ -1218,7 +1218,7 @@
           <a:p>
             <a:fld id="{471E68FF-328F-104F-BC80-393576CFDC5A}" type="datetimeFigureOut">
               <a:rPr lang="en-US" smtClean="0"/>
-              <a:t>5/19/20</a:t>
+              <a:t>5/20/20</a:t>
             </a:fld>
             <a:endParaRPr lang="en-US"/>
           </a:p>
@@ -1580,7 +1580,7 @@
           <a:p>
             <a:fld id="{471E68FF-328F-104F-BC80-393576CFDC5A}" type="datetimeFigureOut">
               <a:rPr lang="en-US" smtClean="0"/>
-              <a:t>5/19/20</a:t>
+              <a:t>5/20/20</a:t>
             </a:fld>
             <a:endParaRPr lang="en-US"/>
           </a:p>
@@ -1693,7 +1693,7 @@
           <a:p>
             <a:fld id="{471E68FF-328F-104F-BC80-393576CFDC5A}" type="datetimeFigureOut">
               <a:rPr lang="en-US" smtClean="0"/>
-              <a:t>5/19/20</a:t>
+              <a:t>5/20/20</a:t>
             </a:fld>
             <a:endParaRPr lang="en-US"/>
           </a:p>
@@ -1783,7 +1783,7 @@
           <a:p>
             <a:fld id="{471E68FF-328F-104F-BC80-393576CFDC5A}" type="datetimeFigureOut">
               <a:rPr lang="en-US" smtClean="0"/>
-              <a:t>5/19/20</a:t>
+              <a:t>5/20/20</a:t>
             </a:fld>
             <a:endParaRPr lang="en-US"/>
           </a:p>
@@ -2055,7 +2055,7 @@
           <a:p>
             <a:fld id="{471E68FF-328F-104F-BC80-393576CFDC5A}" type="datetimeFigureOut">
               <a:rPr lang="en-US" smtClean="0"/>
-              <a:t>5/19/20</a:t>
+              <a:t>5/20/20</a:t>
             </a:fld>
             <a:endParaRPr lang="en-US"/>
           </a:p>
@@ -2307,7 +2307,7 @@
           <a:p>
             <a:fld id="{471E68FF-328F-104F-BC80-393576CFDC5A}" type="datetimeFigureOut">
               <a:rPr lang="en-US" smtClean="0"/>
-              <a:t>5/19/20</a:t>
+              <a:t>5/20/20</a:t>
             </a:fld>
             <a:endParaRPr lang="en-US"/>
           </a:p>
@@ -2515,7 +2515,7 @@
           <a:p>
             <a:fld id="{471E68FF-328F-104F-BC80-393576CFDC5A}" type="datetimeFigureOut">
               <a:rPr lang="en-US" smtClean="0"/>
-              <a:t>5/19/20</a:t>
+              <a:t>5/20/20</a:t>
             </a:fld>
             <a:endParaRPr lang="en-US"/>
           </a:p>
@@ -3182,7 +3182,7 @@
           <a:p>
             <a:r>
               <a:rPr lang="en-US" dirty="0"/>
-              <a:t>Language Features and usage</a:t>
+              <a:t>Language Features and usage - coverage</a:t>
             </a:r>
           </a:p>
           <a:p>
@@ -3338,7 +3338,7 @@
           <a:p>
             <a:r>
               <a:rPr lang="en-US" dirty="0"/>
-              <a:t>Folder in the playground</a:t>
+              <a:t>Folder in the playground – selected content</a:t>
             </a:r>
           </a:p>
           <a:p>
@@ -3455,7 +3455,15 @@
             <a:pPr lvl="1"/>
             <a:r>
               <a:rPr lang="en-US" dirty="0"/>
-              <a:t>?</a:t>
+              <a:t>Objects</a:t>
+            </a:r>
+            <a:r>
+              <a:rPr lang="en-US"/>
+              <a:t>, device</a:t>
+            </a:r>
+            <a:r>
+              <a:rPr lang="en-US" dirty="0"/>
+              <a:t>s</a:t>
             </a:r>
           </a:p>
           <a:p>

</xml_diff>